<commit_message>
Review of the speech
</commit_message>
<xml_diff>
--- a/2024-Postgres-Analytics/slide-sources.pptx
+++ b/2024-Postgres-Analytics/slide-sources.pptx
@@ -4,26 +4,29 @@
   <p:sldMasterIdLst>
     <p:sldMasterId id="2147483648" r:id="rId1"/>
   </p:sldMasterIdLst>
+  <p:notesMasterIdLst>
+    <p:notesMasterId r:id="rId23"/>
+  </p:notesMasterIdLst>
   <p:sldIdLst>
-    <p:sldId id="256" r:id="rId3"/>
-    <p:sldId id="257" r:id="rId4"/>
-    <p:sldId id="258" r:id="rId5"/>
-    <p:sldId id="259" r:id="rId6"/>
-    <p:sldId id="260" r:id="rId7"/>
-    <p:sldId id="261" r:id="rId8"/>
-    <p:sldId id="262" r:id="rId9"/>
-    <p:sldId id="263" r:id="rId10"/>
-    <p:sldId id="264" r:id="rId11"/>
-    <p:sldId id="265" r:id="rId12"/>
-    <p:sldId id="266" r:id="rId13"/>
-    <p:sldId id="267" r:id="rId14"/>
-    <p:sldId id="268" r:id="rId15"/>
-    <p:sldId id="269" r:id="rId16"/>
-    <p:sldId id="270" r:id="rId17"/>
-    <p:sldId id="271" r:id="rId18"/>
-    <p:sldId id="272" r:id="rId19"/>
-    <p:sldId id="273" r:id="rId20"/>
-    <p:sldId id="274" r:id="rId21"/>
+    <p:sldId id="256" r:id="rId4"/>
+    <p:sldId id="257" r:id="rId5"/>
+    <p:sldId id="258" r:id="rId6"/>
+    <p:sldId id="259" r:id="rId7"/>
+    <p:sldId id="260" r:id="rId8"/>
+    <p:sldId id="261" r:id="rId9"/>
+    <p:sldId id="262" r:id="rId10"/>
+    <p:sldId id="263" r:id="rId11"/>
+    <p:sldId id="264" r:id="rId12"/>
+    <p:sldId id="265" r:id="rId13"/>
+    <p:sldId id="266" r:id="rId14"/>
+    <p:sldId id="267" r:id="rId15"/>
+    <p:sldId id="268" r:id="rId16"/>
+    <p:sldId id="269" r:id="rId17"/>
+    <p:sldId id="270" r:id="rId18"/>
+    <p:sldId id="271" r:id="rId19"/>
+    <p:sldId id="272" r:id="rId20"/>
+    <p:sldId id="273" r:id="rId21"/>
+    <p:sldId id="274" r:id="rId22"/>
   </p:sldIdLst>
   <p:sldSz cx="12192000" cy="6858000"/>
   <p:notesSz cx="12192000" cy="6858000"/>
@@ -123,6 +126,408 @@
     </a:lvl9pPr>
   </p:defaultTextStyle>
 </p:presentation>
+</file>
+
+<file path=ppt/notesMasters/notesMaster1.xml><?xml version="1.0" encoding="utf-8"?>
+<p:notesMaster xmlns:a="http://schemas.openxmlformats.org/drawingml/2006/main" xmlns:r="http://schemas.openxmlformats.org/officeDocument/2006/relationships" xmlns:p="http://schemas.openxmlformats.org/presentationml/2006/main">
+  <p:cSld name="">
+    <p:bg>
+      <p:bgRef idx="1001">
+        <a:schemeClr val="bg1"/>
+      </p:bgRef>
+    </p:bg>
+    <p:spTree>
+      <p:nvGrpSpPr>
+        <p:cNvPr id="1" name=""/>
+        <p:cNvGrpSpPr/>
+        <p:nvPr/>
+      </p:nvGrpSpPr>
+      <p:grpSpPr bwMode="auto">
+        <a:xfrm>
+          <a:off x="0" y="0"/>
+          <a:ext cx="0" cy="0"/>
+          <a:chOff x="0" y="0"/>
+          <a:chExt cx="0" cy="0"/>
+        </a:xfrm>
+      </p:grpSpPr>
+      <p:sp>
+        <p:nvSpPr>
+          <p:cNvPr id="2" name="Header Placeholder 1"/>
+          <p:cNvSpPr>
+            <a:spLocks noGrp="1"/>
+          </p:cNvSpPr>
+          <p:nvPr>
+            <p:ph type="hdr" sz="quarter"/>
+          </p:nvPr>
+        </p:nvSpPr>
+        <p:spPr bwMode="auto">
+          <a:xfrm>
+            <a:off x="0" y="0"/>
+            <a:ext cx="2971800" cy="458788"/>
+          </a:xfrm>
+          <a:prstGeom prst="rect">
+            <a:avLst/>
+          </a:prstGeom>
+        </p:spPr>
+        <p:txBody>
+          <a:bodyPr vert="horz" lIns="91440" tIns="45720" rIns="91440" bIns="45720" rtlCol="0" anchor="ctr"/>
+          <a:lstStyle>
+            <a:lvl1pPr algn="l">
+              <a:defRPr sz="1200"/>
+            </a:lvl1pPr>
+          </a:lstStyle>
+          <a:p>
+            <a:pPr>
+              <a:defRPr/>
+            </a:pPr>
+            <a:endParaRPr/>
+          </a:p>
+        </p:txBody>
+      </p:sp>
+      <p:sp>
+        <p:nvSpPr>
+          <p:cNvPr id="3" name="Date Placeholder 2"/>
+          <p:cNvSpPr>
+            <a:spLocks noGrp="1"/>
+          </p:cNvSpPr>
+          <p:nvPr>
+            <p:ph type="dt" idx="2"/>
+          </p:nvPr>
+        </p:nvSpPr>
+        <p:spPr bwMode="auto">
+          <a:xfrm>
+            <a:off x="3884613" y="0"/>
+            <a:ext cx="2971800" cy="458788"/>
+          </a:xfrm>
+          <a:prstGeom prst="rect">
+            <a:avLst/>
+          </a:prstGeom>
+        </p:spPr>
+        <p:txBody>
+          <a:bodyPr vert="horz" lIns="91440" tIns="45720" rIns="91440" bIns="45720" rtlCol="0" anchor="ctr"/>
+          <a:lstStyle>
+            <a:lvl1pPr algn="r">
+              <a:defRPr sz="1200"/>
+            </a:lvl1pPr>
+          </a:lstStyle>
+          <a:p>
+            <a:pPr>
+              <a:defRPr/>
+            </a:pPr>
+            <a:endParaRPr/>
+          </a:p>
+        </p:txBody>
+      </p:sp>
+      <p:sp>
+        <p:nvSpPr>
+          <p:cNvPr id="3" name="Date Placeholder 2"/>
+          <p:cNvSpPr>
+            <a:spLocks noGrp="1"/>
+          </p:cNvSpPr>
+          <p:nvPr>
+            <p:ph type="dt" idx="3"/>
+          </p:nvPr>
+        </p:nvSpPr>
+        <p:spPr bwMode="auto">
+          <a:xfrm>
+            <a:off x="3884613" y="0"/>
+            <a:ext cx="2971800" cy="458788"/>
+          </a:xfrm>
+          <a:prstGeom prst="rect">
+            <a:avLst/>
+          </a:prstGeom>
+        </p:spPr>
+        <p:txBody>
+          <a:bodyPr vert="horz" lIns="91440" tIns="45720" rIns="91440" bIns="45720" rtlCol="0" anchor="ctr"/>
+          <a:lstStyle>
+            <a:lvl1pPr algn="r">
+              <a:defRPr sz="1200"/>
+            </a:lvl1pPr>
+          </a:lstStyle>
+          <a:p>
+            <a:pPr>
+              <a:defRPr/>
+            </a:pPr>
+            <a:endParaRPr/>
+          </a:p>
+        </p:txBody>
+      </p:sp>
+      <p:sp>
+        <p:nvSpPr>
+          <p:cNvPr id="5" name="Notes Placeholder 4"/>
+          <p:cNvSpPr>
+            <a:spLocks noGrp="1"/>
+          </p:cNvSpPr>
+          <p:nvPr>
+            <p:ph type="body" sz="quarter" idx="1"/>
+          </p:nvPr>
+        </p:nvSpPr>
+        <p:spPr bwMode="auto">
+          <a:xfrm>
+            <a:off x="685800" y="4400550"/>
+            <a:ext cx="5486400" cy="3600450"/>
+          </a:xfrm>
+          <a:prstGeom prst="rect">
+            <a:avLst/>
+          </a:prstGeom>
+        </p:spPr>
+        <p:txBody>
+          <a:bodyPr vert="horz" lIns="91440" tIns="45720" rIns="91440" bIns="45720" rtlCol="0" anchor="ctr"/>
+          <a:lstStyle/>
+          <a:p>
+            <a:pPr>
+              <a:defRPr/>
+            </a:pPr>
+            <a:endParaRPr/>
+          </a:p>
+        </p:txBody>
+      </p:sp>
+      <p:sp>
+        <p:nvSpPr>
+          <p:cNvPr id="6" name="Footer Placeholder 5"/>
+          <p:cNvSpPr>
+            <a:spLocks noGrp="1"/>
+          </p:cNvSpPr>
+          <p:nvPr>
+            <p:ph type="ftr" sz="quarter" idx="4"/>
+          </p:nvPr>
+        </p:nvSpPr>
+        <p:spPr bwMode="auto">
+          <a:xfrm>
+            <a:off x="0" y="8685213"/>
+            <a:ext cx="2971800" cy="458787"/>
+          </a:xfrm>
+          <a:prstGeom prst="rect">
+            <a:avLst/>
+          </a:prstGeom>
+        </p:spPr>
+        <p:txBody>
+          <a:bodyPr vert="horz" lIns="91440" tIns="45720" rIns="91440" bIns="45720" rtlCol="0" anchor="b"/>
+          <a:lstStyle>
+            <a:lvl1pPr algn="l">
+              <a:defRPr sz="1200"/>
+            </a:lvl1pPr>
+          </a:lstStyle>
+          <a:p>
+            <a:pPr>
+              <a:defRPr/>
+            </a:pPr>
+            <a:endParaRPr/>
+          </a:p>
+        </p:txBody>
+      </p:sp>
+      <p:sp>
+        <p:nvSpPr>
+          <p:cNvPr id="7" name="Slide Number Placeholder 6"/>
+          <p:cNvSpPr>
+            <a:spLocks noGrp="1"/>
+          </p:cNvSpPr>
+          <p:nvPr>
+            <p:ph type="sldNum" sz="quarter" idx="10"/>
+          </p:nvPr>
+        </p:nvSpPr>
+        <p:spPr bwMode="auto">
+          <a:xfrm>
+            <a:off x="3884613" y="8685213"/>
+            <a:ext cx="2971800" cy="458787"/>
+          </a:xfrm>
+          <a:prstGeom prst="rect">
+            <a:avLst/>
+          </a:prstGeom>
+        </p:spPr>
+        <p:txBody>
+          <a:bodyPr vert="horz" lIns="91440" tIns="45720" rIns="91440" bIns="45720" rtlCol="0" anchor="b"/>
+          <a:lstStyle>
+            <a:lvl1pPr algn="r">
+              <a:defRPr sz="1200"/>
+            </a:lvl1pPr>
+          </a:lstStyle>
+          <a:p>
+            <a:pPr>
+              <a:defRPr/>
+            </a:pPr>
+            <a:endParaRPr/>
+          </a:p>
+        </p:txBody>
+      </p:sp>
+    </p:spTree>
+  </p:cSld>
+  <p:clrMap bg1="lt1" tx1="dk1" bg2="lt2" tx2="dk2" accent1="accent1" accent2="accent2" accent3="accent3" accent4="accent4" accent5="accent5" accent6="accent6" hlink="hlink" folHlink="folHlink"/>
+  <p:notesStyle>
+    <a:lvl1pPr marL="0" algn="l" defTabSz="914400">
+      <a:defRPr sz="1200">
+        <a:solidFill>
+          <a:schemeClr val="tx1"/>
+        </a:solidFill>
+        <a:latin typeface="+mn-lt"/>
+        <a:ea typeface="+mn-ea"/>
+        <a:cs typeface="+mn-cs"/>
+      </a:defRPr>
+    </a:lvl1pPr>
+    <a:lvl2pPr marL="457200" algn="l" defTabSz="914400">
+      <a:defRPr sz="1200">
+        <a:solidFill>
+          <a:schemeClr val="tx1"/>
+        </a:solidFill>
+        <a:latin typeface="+mn-lt"/>
+        <a:ea typeface="+mn-ea"/>
+        <a:cs typeface="+mn-cs"/>
+      </a:defRPr>
+    </a:lvl2pPr>
+    <a:lvl3pPr marL="914400" algn="l" defTabSz="914400">
+      <a:defRPr sz="1200">
+        <a:solidFill>
+          <a:schemeClr val="tx1"/>
+        </a:solidFill>
+        <a:latin typeface="+mn-lt"/>
+        <a:ea typeface="+mn-ea"/>
+        <a:cs typeface="+mn-cs"/>
+      </a:defRPr>
+    </a:lvl3pPr>
+    <a:lvl4pPr marL="1371600" algn="l" defTabSz="914400">
+      <a:defRPr sz="1200">
+        <a:solidFill>
+          <a:schemeClr val="tx1"/>
+        </a:solidFill>
+        <a:latin typeface="+mn-lt"/>
+        <a:ea typeface="+mn-ea"/>
+        <a:cs typeface="+mn-cs"/>
+      </a:defRPr>
+    </a:lvl4pPr>
+    <a:lvl5pPr marL="1828800" algn="l" defTabSz="914400">
+      <a:defRPr sz="1200">
+        <a:solidFill>
+          <a:schemeClr val="tx1"/>
+        </a:solidFill>
+        <a:latin typeface="+mn-lt"/>
+        <a:ea typeface="+mn-ea"/>
+        <a:cs typeface="+mn-cs"/>
+      </a:defRPr>
+    </a:lvl5pPr>
+    <a:lvl6pPr marL="2286000" algn="l" defTabSz="914400">
+      <a:defRPr sz="1200">
+        <a:solidFill>
+          <a:schemeClr val="tx1"/>
+        </a:solidFill>
+        <a:latin typeface="+mn-lt"/>
+        <a:ea typeface="+mn-ea"/>
+        <a:cs typeface="+mn-cs"/>
+      </a:defRPr>
+    </a:lvl6pPr>
+    <a:lvl7pPr marL="2743200" algn="l" defTabSz="914400">
+      <a:defRPr sz="1200">
+        <a:solidFill>
+          <a:schemeClr val="tx1"/>
+        </a:solidFill>
+        <a:latin typeface="+mn-lt"/>
+        <a:ea typeface="+mn-ea"/>
+        <a:cs typeface="+mn-cs"/>
+      </a:defRPr>
+    </a:lvl7pPr>
+    <a:lvl8pPr marL="3200400" algn="l" defTabSz="914400">
+      <a:defRPr sz="1200">
+        <a:solidFill>
+          <a:schemeClr val="tx1"/>
+        </a:solidFill>
+        <a:latin typeface="+mn-lt"/>
+        <a:ea typeface="+mn-ea"/>
+        <a:cs typeface="+mn-cs"/>
+      </a:defRPr>
+    </a:lvl8pPr>
+    <a:lvl9pPr marL="3657600" algn="l" defTabSz="914400">
+      <a:defRPr sz="1200">
+        <a:solidFill>
+          <a:schemeClr val="tx1"/>
+        </a:solidFill>
+        <a:latin typeface="+mn-lt"/>
+        <a:ea typeface="+mn-ea"/>
+        <a:cs typeface="+mn-cs"/>
+      </a:defRPr>
+    </a:lvl9pPr>
+  </p:notesStyle>
+</p:notesMaster>
+</file>
+
+<file path=ppt/notesSlides/notesSlide1.xml><?xml version="1.0" encoding="utf-8"?>
+<p:notes xmlns:a="http://schemas.openxmlformats.org/drawingml/2006/main" xmlns:r="http://schemas.openxmlformats.org/officeDocument/2006/relationships" xmlns:p="http://schemas.openxmlformats.org/presentationml/2006/main" xmlns:m="http://schemas.openxmlformats.org/officeDocument/2006/math" xmlns:w="http://schemas.openxmlformats.org/wordprocessingml/2006/main">
+  <p:cSld name="">
+    <p:spTree>
+      <p:nvGrpSpPr>
+        <p:cNvPr id="1" name=""/>
+        <p:cNvGrpSpPr/>
+        <p:nvPr/>
+      </p:nvGrpSpPr>
+      <p:grpSpPr bwMode="auto">
+        <a:xfrm>
+          <a:off x="0" y="0"/>
+          <a:ext cx="0" cy="0"/>
+          <a:chOff x="0" y="0"/>
+          <a:chExt cx="0" cy="0"/>
+        </a:xfrm>
+      </p:grpSpPr>
+      <p:sp>
+        <p:nvSpPr>
+          <p:cNvPr id="2" name="Slide Image Placeholder 1"/>
+          <p:cNvSpPr>
+            <a:spLocks noChangeAspect="1" noGrp="1" noRot="1"/>
+          </p:cNvSpPr>
+          <p:nvPr>
+            <p:ph type="sldImg"/>
+          </p:nvPr>
+        </p:nvSpPr>
+        <p:spPr bwMode="auto"/>
+      </p:sp>
+      <p:sp>
+        <p:nvSpPr>
+          <p:cNvPr id="3" name="Notes Placeholder 2"/>
+          <p:cNvSpPr>
+            <a:spLocks noGrp="1"/>
+          </p:cNvSpPr>
+          <p:nvPr>
+            <p:ph type="body" idx="1"/>
+          </p:nvPr>
+        </p:nvSpPr>
+        <p:spPr bwMode="auto"/>
+        <p:txBody>
+          <a:bodyPr/>
+          <a:lstStyle/>
+          <a:p>
+            <a:pPr>
+              <a:defRPr/>
+            </a:pPr>
+            <a:r>
+              <a:rPr/>
+              <a:t>Memoize</a:t>
+            </a:r>
+            <a:endParaRPr/>
+          </a:p>
+        </p:txBody>
+      </p:sp>
+      <p:sp>
+        <p:nvSpPr>
+          <p:cNvPr id="4" name="Slide Number Placeholder 3"/>
+          <p:cNvSpPr>
+            <a:spLocks noGrp="1"/>
+          </p:cNvSpPr>
+          <p:nvPr>
+            <p:ph type="sldNum" sz="quarter" idx="10"/>
+          </p:nvPr>
+        </p:nvSpPr>
+        <p:spPr bwMode="auto"/>
+        <p:txBody>
+          <a:bodyPr/>
+          <a:lstStyle/>
+          <a:p>
+            <a:pPr>
+              <a:defRPr/>
+            </a:pPr>
+            <a:endParaRPr/>
+          </a:p>
+        </p:txBody>
+      </p:sp>
+    </p:spTree>
+  </p:cSld>
+</p:notes>
 </file>
 
 <file path=ppt/slideLayouts/slideLayout1.xml><?xml version="1.0" encoding="utf-8"?>
@@ -6386,7 +6791,7 @@
           <p:nvPr/>
         </p:nvCxnSpPr>
         <p:spPr bwMode="auto">
-          <a:xfrm rot="5399977" flipH="0" flipV="0">
+          <a:xfrm rot="5399976" flipH="0" flipV="0">
             <a:off x="2611841" y="4167331"/>
             <a:ext cx="246173" cy="0"/>
           </a:xfrm>
@@ -6994,7 +7399,7 @@
           <p:nvPr/>
         </p:nvCxnSpPr>
         <p:spPr bwMode="auto">
-          <a:xfrm rot="5399977" flipH="0" flipV="0">
+          <a:xfrm rot="5399976" flipH="0" flipV="0">
             <a:off x="4789261" y="4192935"/>
             <a:ext cx="194964" cy="0"/>
           </a:xfrm>
@@ -7168,7 +7573,7 @@
           <p:nvPr/>
         </p:nvCxnSpPr>
         <p:spPr bwMode="auto">
-          <a:xfrm rot="5399977" flipH="0" flipV="0">
+          <a:xfrm rot="5399976" flipH="0" flipV="0">
             <a:off x="4749485" y="3311946"/>
             <a:ext cx="276534" cy="0"/>
           </a:xfrm>
@@ -7393,7 +7798,7 @@
           <p:nvPr/>
         </p:nvCxnSpPr>
         <p:spPr bwMode="auto">
-          <a:xfrm rot="5399977" flipH="0" flipV="0">
+          <a:xfrm rot="5399976" flipH="0" flipV="0">
             <a:off x="881198" y="5192982"/>
             <a:ext cx="338957" cy="0"/>
           </a:xfrm>
@@ -7747,7 +8152,7 @@
           <p:nvPr/>
         </p:nvCxnSpPr>
         <p:spPr bwMode="auto">
-          <a:xfrm rot="5399977" flipH="0" flipV="0">
+          <a:xfrm rot="5399976" flipH="0" flipV="0">
             <a:off x="889765" y="3241711"/>
             <a:ext cx="327139" cy="0"/>
           </a:xfrm>
@@ -7904,7 +8309,7 @@
           <p:nvPr/>
         </p:nvCxnSpPr>
         <p:spPr bwMode="auto">
-          <a:xfrm rot="5399977" flipH="0" flipV="0">
+          <a:xfrm rot="5399976" flipH="0" flipV="0">
             <a:off x="2944110" y="3579034"/>
             <a:ext cx="214364" cy="0"/>
           </a:xfrm>
@@ -8079,7 +8484,7 @@
           <p:nvPr/>
         </p:nvCxnSpPr>
         <p:spPr bwMode="auto">
-          <a:xfrm rot="5399977" flipH="0" flipV="0">
+          <a:xfrm rot="5399976" flipH="0" flipV="0">
             <a:off x="4582819" y="3579033"/>
             <a:ext cx="214363" cy="0"/>
           </a:xfrm>
@@ -8264,7 +8669,7 @@
           <p:nvPr/>
         </p:nvCxnSpPr>
         <p:spPr bwMode="auto">
-          <a:xfrm rot="5399977" flipH="0" flipV="0">
+          <a:xfrm rot="5399976" flipH="0" flipV="0">
             <a:off x="888723" y="4214391"/>
             <a:ext cx="327743" cy="0"/>
           </a:xfrm>
@@ -8453,7 +8858,7 @@
           <p:nvPr/>
         </p:nvCxnSpPr>
         <p:spPr bwMode="auto">
-          <a:xfrm rot="5399977" flipH="0" flipV="0">
+          <a:xfrm rot="5399976" flipH="0" flipV="0">
             <a:off x="7231197" y="5192982"/>
             <a:ext cx="338956" cy="0"/>
           </a:xfrm>
@@ -8803,7 +9208,7 @@
           <p:nvPr/>
         </p:nvCxnSpPr>
         <p:spPr bwMode="auto">
-          <a:xfrm rot="5399977" flipH="0" flipV="0">
+          <a:xfrm rot="5399976" flipH="0" flipV="0">
             <a:off x="7239765" y="3241710"/>
             <a:ext cx="327138" cy="0"/>
           </a:xfrm>
@@ -9096,7 +9501,7 @@
           <p:nvPr/>
         </p:nvCxnSpPr>
         <p:spPr bwMode="auto">
-          <a:xfrm rot="5399977" flipH="0" flipV="0">
+          <a:xfrm rot="5399976" flipH="0" flipV="0">
             <a:off x="7238722" y="4214391"/>
             <a:ext cx="327742" cy="0"/>
           </a:xfrm>
@@ -9346,7 +9751,7 @@
           <p:nvPr/>
         </p:nvCxnSpPr>
         <p:spPr bwMode="auto">
-          <a:xfrm rot="5399977" flipH="0" flipV="1">
+          <a:xfrm rot="5399976" flipH="0" flipV="1">
             <a:off x="6494247" y="4100941"/>
             <a:ext cx="378951" cy="0"/>
           </a:xfrm>
@@ -9578,7 +9983,7 @@
           <p:nvPr/>
         </p:nvSpPr>
         <p:spPr bwMode="auto">
-          <a:xfrm rot="16199933" flipH="0" flipV="0">
+          <a:xfrm rot="16199932" flipH="0" flipV="0">
             <a:off x="6447100" y="5093057"/>
             <a:ext cx="468311" cy="468311"/>
           </a:xfrm>
@@ -9670,7 +10075,7 @@
           <p:nvPr/>
         </p:nvCxnSpPr>
         <p:spPr bwMode="auto">
-          <a:xfrm rot="5399977" flipH="0" flipV="1">
+          <a:xfrm rot="5399976" flipH="0" flipV="1">
             <a:off x="8491424" y="4100941"/>
             <a:ext cx="378950" cy="0"/>
           </a:xfrm>
@@ -9935,7 +10340,7 @@
           <p:nvPr/>
         </p:nvSpPr>
         <p:spPr bwMode="auto">
-          <a:xfrm rot="16199933" flipH="0" flipV="0">
+          <a:xfrm rot="16199932" flipH="0" flipV="0">
             <a:off x="8444277" y="5093056"/>
             <a:ext cx="468311" cy="468311"/>
           </a:xfrm>
@@ -10027,7 +10432,7 @@
           <p:nvPr/>
         </p:nvCxnSpPr>
         <p:spPr bwMode="auto">
-          <a:xfrm rot="5399977" flipH="0" flipV="1">
+          <a:xfrm rot="5399976" flipH="0" flipV="1">
             <a:off x="10488601" y="4100941"/>
             <a:ext cx="378950" cy="0"/>
           </a:xfrm>
@@ -10300,7 +10705,7 @@
           <p:nvPr/>
         </p:nvSpPr>
         <p:spPr bwMode="auto">
-          <a:xfrm rot="16199933" flipH="0" flipV="0">
+          <a:xfrm rot="16199932" flipH="0" flipV="0">
             <a:off x="10441454" y="5093056"/>
             <a:ext cx="468311" cy="468311"/>
           </a:xfrm>
@@ -10610,7 +11015,7 @@
           <p:nvPr/>
         </p:nvCxnSpPr>
         <p:spPr bwMode="auto">
-          <a:xfrm rot="5399978" flipH="0" flipV="1">
+          <a:xfrm rot="5399977" flipH="0" flipV="1">
             <a:off x="7201852" y="3421820"/>
             <a:ext cx="855552" cy="740852"/>
           </a:xfrm>
@@ -10687,7 +11092,7 @@
           <p:nvPr/>
         </p:nvCxnSpPr>
         <p:spPr bwMode="auto">
-          <a:xfrm rot="5399978" flipH="0" flipV="0">
+          <a:xfrm rot="5399977" flipH="0" flipV="0">
             <a:off x="5154854" y="2729867"/>
             <a:ext cx="1095383" cy="0"/>
           </a:xfrm>
@@ -10913,7 +11318,7 @@
           <p:nvPr/>
         </p:nvCxnSpPr>
         <p:spPr bwMode="auto">
-          <a:xfrm rot="16199934" flipH="0" flipV="0">
+          <a:xfrm rot="16199933" flipH="0" flipV="0">
             <a:off x="5702432" y="3277559"/>
             <a:ext cx="0" cy="0"/>
           </a:xfrm>
@@ -10958,7 +11363,7 @@
           <p:nvPr/>
         </p:nvCxnSpPr>
         <p:spPr bwMode="auto">
-          <a:xfrm rot="5399978" flipH="0" flipV="0">
+          <a:xfrm rot="5399977" flipH="0" flipV="0">
             <a:off x="4795917" y="3829624"/>
             <a:ext cx="421728" cy="420103"/>
           </a:xfrm>
@@ -11077,7 +11482,7 @@
           <p:nvPr/>
         </p:nvCxnSpPr>
         <p:spPr bwMode="auto">
-          <a:xfrm rot="5399978" flipH="0" flipV="1">
+          <a:xfrm rot="5399977" flipH="0" flipV="1">
             <a:off x="6205477" y="3811824"/>
             <a:ext cx="421727" cy="455704"/>
           </a:xfrm>
@@ -11119,7 +11524,7 @@
         </p:nvSpPr>
         <p:spPr bwMode="auto">
           <a:xfrm flipH="0" flipV="0">
-            <a:off x="4604681" y="5769823"/>
+            <a:off x="4604681" y="5769822"/>
             <a:ext cx="358464" cy="389190"/>
           </a:xfrm>
           <a:prstGeom prst="rect">
@@ -11177,7 +11582,7 @@
           <p:nvPr/>
         </p:nvSpPr>
         <p:spPr bwMode="auto">
-          <a:xfrm rot="16199900" flipH="0" flipV="0">
+          <a:xfrm rot="16199899" flipH="0" flipV="0">
             <a:off x="4547290" y="5217364"/>
             <a:ext cx="468310" cy="468310"/>
           </a:xfrm>
@@ -11284,7 +11689,7 @@
           <p:nvPr/>
         </p:nvSpPr>
         <p:spPr bwMode="auto">
-          <a:xfrm rot="16199900" flipH="0" flipV="0">
+          <a:xfrm rot="16199899" flipH="0" flipV="0">
             <a:off x="6410037" y="5217363"/>
             <a:ext cx="468310" cy="468310"/>
           </a:xfrm>
@@ -11610,7 +12015,7 @@
           <p:nvPr/>
         </p:nvCxnSpPr>
         <p:spPr bwMode="auto">
-          <a:xfrm rot="10799956" flipH="0" flipV="1">
+          <a:xfrm rot="10799955" flipH="0" flipV="1">
             <a:off x="6244781" y="3114918"/>
             <a:ext cx="445291" cy="326297"/>
           </a:xfrm>
@@ -12302,7 +12707,7 @@
           <p:nvPr/>
         </p:nvCxnSpPr>
         <p:spPr bwMode="auto">
-          <a:xfrm rot="10799956" flipH="0" flipV="1">
+          <a:xfrm rot="10799955" flipH="0" flipV="1">
             <a:off x="6244783" y="1373788"/>
             <a:ext cx="445291" cy="326297"/>
           </a:xfrm>
@@ -12508,7 +12913,7 @@
           <p:nvPr/>
         </p:nvCxnSpPr>
         <p:spPr bwMode="auto">
-          <a:xfrm rot="16199934" flipH="0" flipV="0">
+          <a:xfrm rot="16199933" flipH="0" flipV="0">
             <a:off x="6540912" y="4086028"/>
             <a:ext cx="0" cy="0"/>
           </a:xfrm>
@@ -12553,7 +12958,7 @@
           <p:nvPr/>
         </p:nvCxnSpPr>
         <p:spPr bwMode="auto">
-          <a:xfrm rot="5399978" flipH="0" flipV="0">
+          <a:xfrm rot="5399977" flipH="0" flipV="0">
             <a:off x="5634396" y="4638093"/>
             <a:ext cx="421728" cy="420103"/>
           </a:xfrm>
@@ -12664,7 +13069,7 @@
           <p:nvPr/>
         </p:nvCxnSpPr>
         <p:spPr bwMode="auto">
-          <a:xfrm rot="5399978" flipH="0" flipV="1">
+          <a:xfrm rot="5399977" flipH="0" flipV="1">
             <a:off x="7043956" y="4620292"/>
             <a:ext cx="421727" cy="455704"/>
           </a:xfrm>
@@ -12775,7 +13180,7 @@
           <p:nvPr/>
         </p:nvCxnSpPr>
         <p:spPr bwMode="auto">
-          <a:xfrm rot="5399978" flipH="0" flipV="1">
+          <a:xfrm rot="5399977" flipH="0" flipV="1">
             <a:off x="6045937" y="3591053"/>
             <a:ext cx="503021" cy="486927"/>
           </a:xfrm>
@@ -12886,8 +13291,8 @@
           <p:nvPr/>
         </p:nvCxnSpPr>
         <p:spPr bwMode="auto">
-          <a:xfrm rot="5399978" flipH="0" flipV="0">
-            <a:off x="4620766" y="3573253"/>
+          <a:xfrm rot="5399977" flipH="0" flipV="0">
+            <a:off x="4620765" y="3573253"/>
             <a:ext cx="451809" cy="471314"/>
           </a:xfrm>
           <a:prstGeom prst="line">
@@ -12997,7 +13402,7 @@
           <p:nvPr/>
         </p:nvCxnSpPr>
         <p:spPr bwMode="auto">
-          <a:xfrm rot="5399978" flipH="0" flipV="0">
+          <a:xfrm rot="5399977" flipH="0" flipV="0">
             <a:off x="5590050" y="2566999"/>
             <a:ext cx="443367" cy="487155"/>
           </a:xfrm>
@@ -13108,7 +13513,7 @@
           <p:nvPr/>
         </p:nvCxnSpPr>
         <p:spPr bwMode="auto">
-          <a:xfrm rot="5399978" flipH="0" flipV="1">
+          <a:xfrm rot="5399977" flipH="0" flipV="1">
             <a:off x="7008100" y="2607761"/>
             <a:ext cx="499765" cy="462028"/>
           </a:xfrm>
@@ -13207,7 +13612,7 @@
           <p:nvPr/>
         </p:nvCxnSpPr>
         <p:spPr bwMode="auto">
-          <a:xfrm rot="10799990" flipH="0" flipV="1">
+          <a:xfrm rot="10799989" flipH="0" flipV="1">
             <a:off x="7228205" y="4244795"/>
             <a:ext cx="340165" cy="164359"/>
           </a:xfrm>
@@ -13346,7 +13751,7 @@
         <p:spPr bwMode="auto">
           <a:xfrm rot="0" flipH="0" flipV="0">
             <a:off x="4352402" y="1728919"/>
-            <a:ext cx="1456576" cy="274355"/>
+            <a:ext cx="1456575" cy="274355"/>
           </a:xfrm>
           <a:prstGeom prst="rect">
             <a:avLst/>
@@ -13406,7 +13811,7 @@
           <p:nvPr/>
         </p:nvCxnSpPr>
         <p:spPr bwMode="auto">
-          <a:xfrm rot="5399978" flipH="0" flipV="1">
+          <a:xfrm rot="5399977" flipH="0" flipV="1">
             <a:off x="5798415" y="1875744"/>
             <a:ext cx="266849" cy="246944"/>
           </a:xfrm>
@@ -13574,15 +13979,15 @@
           <p:cNvPr id="436213978" name=""/>
           <p:cNvCxnSpPr>
             <a:cxnSpLocks/>
-            <a:stCxn id="375855938" idx="3"/>
+            <a:stCxn id="426868382" idx="4"/>
             <a:endCxn id="1920693222" idx="0"/>
           </p:cNvCxnSpPr>
           <p:nvPr/>
         </p:nvCxnSpPr>
         <p:spPr bwMode="auto">
-          <a:xfrm rot="5399976" flipH="0" flipV="0">
-            <a:off x="8750820" y="5140798"/>
-            <a:ext cx="458042" cy="465815"/>
+          <a:xfrm rot="5399978" flipH="0" flipV="0">
+            <a:off x="8666868" y="5838586"/>
+            <a:ext cx="173356" cy="0"/>
           </a:xfrm>
           <a:prstGeom prst="line">
             <a:avLst/>
@@ -13593,8 +13998,8 @@
             </a:solidFill>
             <a:prstDash val="solid"/>
             <a:miter lim="800000"/>
-            <a:headEnd type="stealth"/>
-            <a:tailEnd type="oval" w="lg" len="lg"/>
+            <a:headEnd type="none"/>
+            <a:tailEnd type="none" w="lg" len="lg"/>
           </a:ln>
         </p:spPr>
         <p:style>
@@ -13638,8 +14043,8 @@
             </a:solidFill>
             <a:prstDash val="solid"/>
             <a:miter lim="800000"/>
-            <a:headEnd type="stealth"/>
-            <a:tailEnd type="oval" w="lg" len="lg"/>
+            <a:headEnd type="none"/>
+            <a:tailEnd type="none" w="lg" len="lg"/>
           </a:ln>
         </p:spPr>
         <p:style>
@@ -13670,7 +14075,7 @@
         </p:nvCxnSpPr>
         <p:spPr bwMode="auto">
           <a:xfrm rot="5399976" flipH="0" flipV="1">
-            <a:off x="8653748" y="2593609"/>
+            <a:off x="8658518" y="2593814"/>
             <a:ext cx="385170" cy="0"/>
           </a:xfrm>
           <a:prstGeom prst="line">
@@ -13682,8 +14087,8 @@
             </a:solidFill>
             <a:prstDash val="solid"/>
             <a:miter lim="800000"/>
-            <a:headEnd type="stealth"/>
-            <a:tailEnd type="oval" w="lg" len="lg"/>
+            <a:headEnd type="none"/>
+            <a:tailEnd type="none" w="lg" len="lg"/>
           </a:ln>
         </p:spPr>
         <p:style>
@@ -13711,7 +14116,7 @@
         </p:nvSpPr>
         <p:spPr bwMode="auto">
           <a:xfrm rot="0" flipH="0" flipV="0">
-            <a:off x="8281849" y="2786195"/>
+            <a:off x="8283600" y="2786400"/>
             <a:ext cx="1135009" cy="645239"/>
           </a:xfrm>
           <a:prstGeom prst="ellipse">
@@ -13748,7 +14153,7 @@
           </a:fontRef>
         </p:style>
         <p:txBody>
-          <a:bodyPr vertOverflow="overflow" horzOverflow="overflow" vert="horz" wrap="square" lIns="91440" tIns="45720" rIns="91440" bIns="45720" numCol="1" spcCol="0" rtlCol="0" fromWordArt="0" anchor="ctr" anchorCtr="0" forceAA="0" upright="0" compatLnSpc="0"/>
+          <a:bodyPr vertOverflow="overflow" horzOverflow="overflow" vert="horz" wrap="square" lIns="0" tIns="0" rIns="0" bIns="0" numCol="1" spcCol="0" rtlCol="0" fromWordArt="0" anchor="ctr" anchorCtr="0" forceAA="0" upright="0" compatLnSpc="0"/>
           <a:p>
             <a:pPr algn="ctr">
               <a:defRPr/>
@@ -13759,7 +14164,15 @@
                   <a:schemeClr val="tx1"/>
                 </a:solidFill>
               </a:rPr>
-              <a:t>Index Scan</a:t>
+              <a:t>I</a:t>
+            </a:r>
+            <a:r>
+              <a:rPr sz="1600">
+                <a:solidFill>
+                  <a:schemeClr val="tx1"/>
+                </a:solidFill>
+              </a:rPr>
+              <a:t>ndex Scan</a:t>
             </a:r>
             <a:endParaRPr>
               <a:solidFill>
@@ -13777,7 +14190,7 @@
         </p:nvSpPr>
         <p:spPr bwMode="auto">
           <a:xfrm rot="0" flipH="0" flipV="0">
-            <a:off x="9113932" y="599583"/>
+            <a:off x="9115200" y="601200"/>
             <a:ext cx="1374131" cy="645239"/>
           </a:xfrm>
           <a:prstGeom prst="ellipse">
@@ -13814,13 +14227,13 @@
           </a:fontRef>
         </p:style>
         <p:txBody>
-          <a:bodyPr vertOverflow="overflow" horzOverflow="overflow" vert="horz" wrap="square" lIns="91440" tIns="45720" rIns="91440" bIns="45720" numCol="1" spcCol="0" rtlCol="0" fromWordArt="0" anchor="ctr" anchorCtr="0" forceAA="0" upright="0" compatLnSpc="0"/>
+          <a:bodyPr vertOverflow="overflow" horzOverflow="overflow" vert="horz" wrap="square" lIns="0" tIns="0" rIns="0" bIns="0" numCol="1" spcCol="0" rtlCol="0" fromWordArt="0" anchor="ctr" anchorCtr="0" forceAA="0" upright="0" compatLnSpc="0"/>
           <a:p>
             <a:pPr algn="ctr">
               <a:defRPr/>
             </a:pPr>
             <a:r>
-              <a:rPr>
+              <a:rPr sz="1600">
                 <a:solidFill>
                   <a:schemeClr val="tx1"/>
                 </a:solidFill>
@@ -13846,9 +14259,9 @@
           <p:nvPr/>
         </p:nvCxnSpPr>
         <p:spPr bwMode="auto">
-          <a:xfrm rot="5399976" flipH="0" flipV="1">
-            <a:off x="9569513" y="1867643"/>
-            <a:ext cx="1635864" cy="201236"/>
+          <a:xfrm rot="5399978" flipH="0" flipV="1">
+            <a:off x="9571371" y="1868667"/>
+            <a:ext cx="1634454" cy="201009"/>
           </a:xfrm>
           <a:prstGeom prst="line">
             <a:avLst/>
@@ -13859,8 +14272,8 @@
             </a:solidFill>
             <a:prstDash val="solid"/>
             <a:miter lim="800000"/>
-            <a:headEnd type="stealth"/>
-            <a:tailEnd type="oval" w="lg" len="lg"/>
+            <a:headEnd type="none"/>
+            <a:tailEnd type="none" w="lg" len="lg"/>
           </a:ln>
         </p:spPr>
         <p:style>
@@ -13888,7 +14301,7 @@
         </p:nvSpPr>
         <p:spPr bwMode="auto">
           <a:xfrm rot="0" flipH="0" flipV="0">
-            <a:off x="9920559" y="2786194"/>
+            <a:off x="9921599" y="2786400"/>
             <a:ext cx="1135008" cy="645239"/>
           </a:xfrm>
           <a:prstGeom prst="ellipse">
@@ -13925,20 +14338,20 @@
           </a:fontRef>
         </p:style>
         <p:txBody>
-          <a:bodyPr vertOverflow="overflow" horzOverflow="overflow" vert="horz" wrap="square" lIns="91440" tIns="45720" rIns="91440" bIns="45720" numCol="1" spcCol="0" rtlCol="0" fromWordArt="0" anchor="ctr" anchorCtr="0" forceAA="0" upright="0" compatLnSpc="0"/>
+          <a:bodyPr vertOverflow="overflow" horzOverflow="overflow" vert="horz" wrap="square" lIns="0" tIns="0" rIns="0" bIns="0" numCol="1" spcCol="0" rtlCol="0" fromWordArt="0" anchor="ctr" anchorCtr="0" forceAA="0" upright="0" compatLnSpc="0"/>
           <a:p>
             <a:pPr algn="ctr">
               <a:defRPr/>
             </a:pPr>
             <a:r>
-              <a:rPr>
+              <a:rPr sz="1600">
                 <a:solidFill>
                   <a:schemeClr val="tx1"/>
                 </a:solidFill>
               </a:rPr>
               <a:t>Index Scan</a:t>
             </a:r>
-            <a:endParaRPr>
+            <a:endParaRPr sz="1600">
               <a:solidFill>
                 <a:schemeClr val="tx1"/>
               </a:solidFill>
@@ -13961,7 +14374,7 @@
             <a:avLst/>
           </a:prstGeom>
           <a:blipFill>
-            <a:blip r:embed="rId2"/>
+            <a:blip r:embed="rId3"/>
             <a:tile/>
           </a:blipFill>
           <a:ln w="28575" cap="flat" cmpd="sng" algn="ctr">
@@ -14069,7 +14482,7 @@
             <a:avLst/>
           </a:prstGeom>
           <a:blipFill>
-            <a:blip r:embed="rId3"/>
+            <a:blip r:embed="rId4"/>
             <a:tile/>
           </a:blipFill>
           <a:ln w="28575" cap="flat" cmpd="sng" algn="ctr">
@@ -14128,7 +14541,12 @@
           <a:prstGeom prst="rect">
             <a:avLst/>
           </a:prstGeom>
-          <a:noFill/>
+          <a:solidFill>
+            <a:schemeClr val="accent3">
+              <a:lumMod val="40000"/>
+              <a:lumOff val="60000"/>
+            </a:schemeClr>
+          </a:solidFill>
           <a:ln w="19049">
             <a:solidFill>
               <a:schemeClr val="tx1"/>
@@ -14166,7 +14584,12 @@
           <a:prstGeom prst="rect">
             <a:avLst/>
           </a:prstGeom>
-          <a:noFill/>
+          <a:solidFill>
+            <a:schemeClr val="accent3">
+              <a:lumMod val="40000"/>
+              <a:lumOff val="60000"/>
+            </a:schemeClr>
+          </a:solidFill>
           <a:ln w="19049">
             <a:solidFill>
               <a:schemeClr val="tx1"/>
@@ -14204,7 +14627,12 @@
           <a:prstGeom prst="rect">
             <a:avLst/>
           </a:prstGeom>
-          <a:noFill/>
+          <a:solidFill>
+            <a:schemeClr val="accent3">
+              <a:lumMod val="40000"/>
+              <a:lumOff val="60000"/>
+            </a:schemeClr>
+          </a:solidFill>
           <a:ln w="19049">
             <a:solidFill>
               <a:schemeClr val="accent1">
@@ -14244,7 +14672,12 @@
           <a:prstGeom prst="rect">
             <a:avLst/>
           </a:prstGeom>
-          <a:noFill/>
+          <a:solidFill>
+            <a:schemeClr val="accent3">
+              <a:lumMod val="40000"/>
+              <a:lumOff val="60000"/>
+            </a:schemeClr>
+          </a:solidFill>
           <a:ln w="19049">
             <a:solidFill>
               <a:schemeClr val="tx1"/>
@@ -14276,13 +14709,18 @@
         </p:nvSpPr>
         <p:spPr bwMode="auto">
           <a:xfrm flipH="0" flipV="0">
-            <a:off x="8085407" y="2083524"/>
-            <a:ext cx="370734" cy="304835"/>
+            <a:off x="8085406" y="2083523"/>
+            <a:ext cx="371382" cy="305159"/>
           </a:xfrm>
           <a:prstGeom prst="rect">
             <a:avLst/>
           </a:prstGeom>
-          <a:noFill/>
+          <a:solidFill>
+            <a:schemeClr val="accent3">
+              <a:lumMod val="40000"/>
+              <a:lumOff val="60000"/>
+            </a:schemeClr>
+          </a:solidFill>
           <a:ln w="19049">
             <a:solidFill>
               <a:schemeClr val="tx1"/>
@@ -14301,12 +14739,22 @@
             <a:r>
               <a:rPr sz="1400">
                 <a:solidFill>
-                  <a:schemeClr val="accent1"/>
+                  <a:schemeClr val="accent3">
+                    <a:lumMod val="40000"/>
+                    <a:lumOff val="60000"/>
+                  </a:schemeClr>
                 </a:solidFill>
               </a:rPr>
               <a:t>x3</a:t>
             </a:r>
-            <a:endParaRPr/>
+            <a:endParaRPr>
+              <a:solidFill>
+                <a:schemeClr val="accent3">
+                  <a:lumMod val="40000"/>
+                  <a:lumOff val="60000"/>
+                </a:schemeClr>
+              </a:solidFill>
+            </a:endParaRPr>
           </a:p>
         </p:txBody>
       </p:sp>
@@ -14318,13 +14766,18 @@
         </p:nvSpPr>
         <p:spPr bwMode="auto">
           <a:xfrm flipH="0" flipV="0">
-            <a:off x="8454116" y="2083524"/>
-            <a:ext cx="1319628" cy="304835"/>
+            <a:off x="8454115" y="2083523"/>
+            <a:ext cx="1320276" cy="305159"/>
           </a:xfrm>
           <a:prstGeom prst="rect">
             <a:avLst/>
           </a:prstGeom>
-          <a:noFill/>
+          <a:solidFill>
+            <a:schemeClr val="accent3">
+              <a:lumMod val="40000"/>
+              <a:lumOff val="60000"/>
+            </a:schemeClr>
+          </a:solidFill>
           <a:ln w="19049">
             <a:solidFill>
               <a:schemeClr val="tx1"/>
@@ -14343,7 +14796,10 @@
             <a:r>
               <a:rPr sz="1400">
                 <a:solidFill>
-                  <a:schemeClr val="accent1"/>
+                  <a:schemeClr val="accent3">
+                    <a:lumMod val="40000"/>
+                    <a:lumOff val="60000"/>
+                  </a:schemeClr>
                 </a:solidFill>
               </a:rPr>
               <a:t>Cached tuples</a:t>
@@ -14367,9 +14823,9 @@
           <p:nvPr/>
         </p:nvCxnSpPr>
         <p:spPr bwMode="auto">
-          <a:xfrm rot="5399976" flipH="0" flipV="0">
-            <a:off x="9050090" y="1214171"/>
-            <a:ext cx="328920" cy="201236"/>
+          <a:xfrm rot="5399978" flipH="0" flipV="0">
+            <a:off x="9051531" y="1214344"/>
+            <a:ext cx="327303" cy="202505"/>
           </a:xfrm>
           <a:prstGeom prst="line">
             <a:avLst/>
@@ -14380,8 +14836,8 @@
             </a:solidFill>
             <a:prstDash val="solid"/>
             <a:miter lim="800000"/>
-            <a:headEnd type="stealth"/>
-            <a:tailEnd type="oval" w="lg" len="lg"/>
+            <a:headEnd type="none"/>
+            <a:tailEnd type="none" w="lg" len="lg"/>
           </a:ln>
         </p:spPr>
         <p:style>
@@ -14557,8 +15013,8 @@
             </a:solidFill>
             <a:prstDash val="solid"/>
             <a:miter lim="800000"/>
-            <a:headEnd type="stealth"/>
-            <a:tailEnd type="oval" w="lg" len="lg"/>
+            <a:headEnd type="none"/>
+            <a:tailEnd type="none" w="lg" len="lg"/>
           </a:ln>
         </p:spPr>
         <p:style>
@@ -14969,7 +15425,12 @@
           <a:prstGeom prst="rect">
             <a:avLst/>
           </a:prstGeom>
-          <a:noFill/>
+          <a:solidFill>
+            <a:schemeClr val="accent4">
+              <a:lumMod val="40000"/>
+              <a:lumOff val="60000"/>
+            </a:schemeClr>
+          </a:solidFill>
           <a:ln w="12699">
             <a:solidFill>
               <a:schemeClr val="accent4"/>
@@ -15007,7 +15468,12 @@
           <a:prstGeom prst="rect">
             <a:avLst/>
           </a:prstGeom>
-          <a:noFill/>
+          <a:solidFill>
+            <a:schemeClr val="accent4">
+              <a:lumMod val="40000"/>
+              <a:lumOff val="60000"/>
+            </a:schemeClr>
+          </a:solidFill>
           <a:ln w="12699">
             <a:solidFill>
               <a:schemeClr val="accent4"/>
@@ -15039,13 +15505,18 @@
         </p:nvSpPr>
         <p:spPr bwMode="auto">
           <a:xfrm flipH="0" flipV="0">
-            <a:off x="3629288" y="2357671"/>
-            <a:ext cx="900893" cy="365795"/>
+            <a:off x="3629287" y="2357670"/>
+            <a:ext cx="901541" cy="366119"/>
           </a:xfrm>
           <a:prstGeom prst="rect">
             <a:avLst/>
           </a:prstGeom>
-          <a:noFill/>
+          <a:solidFill>
+            <a:schemeClr val="accent4">
+              <a:lumMod val="40000"/>
+              <a:lumOff val="60000"/>
+            </a:schemeClr>
+          </a:solidFill>
           <a:ln w="12699">
             <a:solidFill>
               <a:schemeClr val="accent4"/>
@@ -15063,7 +15534,7 @@
             </a:pPr>
             <a:r>
               <a:rPr i="1"/>
-              <a:t>B.x = 1</a:t>
+              <a:t>B.y = 1</a:t>
             </a:r>
             <a:endParaRPr/>
           </a:p>
@@ -15167,8 +15638,8 @@
         </p:nvCxnSpPr>
         <p:spPr bwMode="auto">
           <a:xfrm rot="0" flipH="0" flipV="0">
-            <a:off x="8270774" y="2712656"/>
-            <a:ext cx="177293" cy="168031"/>
+            <a:off x="8270773" y="2712654"/>
+            <a:ext cx="179044" cy="168238"/>
           </a:xfrm>
           <a:prstGeom prst="line">
             <a:avLst/>
@@ -15206,16 +15677,24 @@
         </p:nvSpPr>
         <p:spPr bwMode="auto">
           <a:xfrm flipH="0" flipV="0">
-            <a:off x="11116143" y="2481100"/>
-            <a:ext cx="900893" cy="365795"/>
+            <a:off x="11116143" y="2481099"/>
+            <a:ext cx="901541" cy="366119"/>
           </a:xfrm>
           <a:prstGeom prst="rect">
             <a:avLst/>
           </a:prstGeom>
-          <a:noFill/>
+          <a:solidFill>
+            <a:schemeClr val="accent4">
+              <a:lumMod val="40000"/>
+              <a:lumOff val="60000"/>
+            </a:schemeClr>
+          </a:solidFill>
           <a:ln w="12699">
             <a:solidFill>
-              <a:schemeClr val="accent4"/>
+              <a:schemeClr val="accent4">
+                <a:lumMod val="40000"/>
+                <a:lumOff val="60000"/>
+              </a:schemeClr>
             </a:solidFill>
             <a:prstDash val="solid"/>
           </a:ln>
@@ -15230,7 +15709,7 @@
             </a:pPr>
             <a:r>
               <a:rPr i="1"/>
-              <a:t>B.x = 1</a:t>
+              <a:t>B.y = 1</a:t>
             </a:r>
             <a:endParaRPr/>
           </a:p>
@@ -15247,9 +15726,9 @@
           <p:nvPr/>
         </p:nvCxnSpPr>
         <p:spPr bwMode="auto">
-          <a:xfrm rot="10799989" flipH="0" flipV="1">
-            <a:off x="10889349" y="2663997"/>
-            <a:ext cx="226793" cy="216688"/>
+          <a:xfrm rot="10799990" flipH="0" flipV="1">
+            <a:off x="10890389" y="2663997"/>
+            <a:ext cx="225752" cy="216895"/>
           </a:xfrm>
           <a:prstGeom prst="line">
             <a:avLst/>
@@ -15287,7 +15766,7 @@
         </p:nvSpPr>
         <p:spPr bwMode="auto">
           <a:xfrm rot="0" flipH="0" flipV="0">
-            <a:off x="8179429" y="5602726"/>
+            <a:off x="8179200" y="5925264"/>
             <a:ext cx="1135008" cy="645239"/>
           </a:xfrm>
           <a:prstGeom prst="ellipse">
@@ -15324,13 +15803,13 @@
           </a:fontRef>
         </p:style>
         <p:txBody>
-          <a:bodyPr vertOverflow="overflow" horzOverflow="overflow" vert="horz" wrap="square" lIns="91440" tIns="45720" rIns="91440" bIns="45720" numCol="1" spcCol="0" rtlCol="0" fromWordArt="0" anchor="ctr" anchorCtr="0" forceAA="0" upright="0" compatLnSpc="0"/>
+          <a:bodyPr vertOverflow="overflow" horzOverflow="overflow" vert="horz" wrap="square" lIns="0" tIns="0" rIns="0" bIns="0" numCol="1" spcCol="0" rtlCol="0" fromWordArt="0" anchor="ctr" anchorCtr="0" forceAA="0" upright="0" compatLnSpc="0"/>
           <a:p>
             <a:pPr algn="ctr">
               <a:defRPr/>
             </a:pPr>
             <a:r>
-              <a:rPr>
+              <a:rPr sz="1600">
                 <a:solidFill>
                   <a:schemeClr val="tx1"/>
                 </a:solidFill>
@@ -15353,7 +15832,7 @@
         </p:nvSpPr>
         <p:spPr bwMode="auto">
           <a:xfrm rot="0" flipH="0" flipV="0">
-            <a:off x="9011512" y="4593937"/>
+            <a:off x="9010800" y="4316172"/>
             <a:ext cx="1374130" cy="645239"/>
           </a:xfrm>
           <a:prstGeom prst="ellipse">
@@ -15390,13 +15869,13 @@
           </a:fontRef>
         </p:style>
         <p:txBody>
-          <a:bodyPr vertOverflow="overflow" horzOverflow="overflow" vert="horz" wrap="square" lIns="91440" tIns="45720" rIns="91440" bIns="45720" numCol="1" spcCol="0" rtlCol="0" fromWordArt="0" anchor="ctr" anchorCtr="0" forceAA="0" upright="0" compatLnSpc="0"/>
+          <a:bodyPr vertOverflow="overflow" horzOverflow="overflow" vert="horz" wrap="square" lIns="0" tIns="0" rIns="0" bIns="0" numCol="1" spcCol="0" rtlCol="0" fromWordArt="0" anchor="ctr" anchorCtr="0" forceAA="0" upright="0" compatLnSpc="0"/>
           <a:p>
             <a:pPr algn="ctr">
               <a:defRPr/>
             </a:pPr>
             <a:r>
-              <a:rPr>
+              <a:rPr sz="1600">
                 <a:solidFill>
                   <a:schemeClr val="tx1"/>
                 </a:solidFill>
@@ -15417,13 +15896,14 @@
           <p:cNvCxnSpPr>
             <a:cxnSpLocks/>
             <a:stCxn id="375855938" idx="5"/>
+            <a:endCxn id="1721609776" idx="0"/>
           </p:cNvCxnSpPr>
           <p:nvPr/>
         </p:nvCxnSpPr>
         <p:spPr bwMode="auto">
-          <a:xfrm rot="5399976" flipH="0" flipV="1">
-            <a:off x="10056004" y="5273086"/>
-            <a:ext cx="458040" cy="201236"/>
+          <a:xfrm rot="5399978" flipH="0" flipV="1">
+            <a:off x="9755025" y="5295586"/>
+            <a:ext cx="1058346" cy="201010"/>
           </a:xfrm>
           <a:prstGeom prst="line">
             <a:avLst/>
@@ -15434,8 +15914,8 @@
             </a:solidFill>
             <a:prstDash val="solid"/>
             <a:miter lim="800000"/>
-            <a:headEnd type="stealth"/>
-            <a:tailEnd type="oval" w="lg" len="lg"/>
+            <a:headEnd type="none"/>
+            <a:tailEnd type="none" w="lg" len="lg"/>
           </a:ln>
         </p:spPr>
         <p:style>
@@ -15463,17 +15943,14 @@
         </p:nvSpPr>
         <p:spPr bwMode="auto">
           <a:xfrm rot="0" flipH="0" flipV="0">
-            <a:off x="9818139" y="5602726"/>
+            <a:off x="9817200" y="5925264"/>
             <a:ext cx="1135008" cy="645239"/>
           </a:xfrm>
           <a:prstGeom prst="ellipse">
             <a:avLst/>
           </a:prstGeom>
           <a:solidFill>
-            <a:schemeClr val="accent3">
-              <a:lumMod val="40000"/>
-              <a:lumOff val="60000"/>
-            </a:schemeClr>
+            <a:srgbClr val="FF0000"/>
           </a:solidFill>
           <a:ln w="12700" cap="flat" cmpd="sng" algn="ctr">
             <a:solidFill>
@@ -15500,20 +15977,20 @@
           </a:fontRef>
         </p:style>
         <p:txBody>
-          <a:bodyPr vertOverflow="overflow" horzOverflow="overflow" vert="horz" wrap="square" lIns="91440" tIns="45720" rIns="91440" bIns="45720" numCol="1" spcCol="0" rtlCol="0" fromWordArt="0" anchor="ctr" anchorCtr="0" forceAA="0" upright="0" compatLnSpc="0"/>
+          <a:bodyPr vertOverflow="overflow" horzOverflow="overflow" vert="horz" wrap="square" lIns="0" tIns="0" rIns="0" bIns="0" numCol="1" spcCol="0" rtlCol="0" fromWordArt="0" anchor="ctr" anchorCtr="0" forceAA="0" upright="0" compatLnSpc="0"/>
           <a:p>
             <a:pPr algn="ctr">
               <a:defRPr/>
             </a:pPr>
             <a:r>
-              <a:rPr>
+              <a:rPr sz="1600">
                 <a:solidFill>
                   <a:schemeClr val="tx1"/>
                 </a:solidFill>
               </a:rPr>
-              <a:t>Index Scan</a:t>
-            </a:r>
-            <a:endParaRPr>
+              <a:t>Seq Scan</a:t>
+            </a:r>
+            <a:endParaRPr sz="1600">
               <a:solidFill>
                 <a:schemeClr val="tx1"/>
               </a:solidFill>
@@ -15529,16 +16006,24 @@
         </p:nvSpPr>
         <p:spPr bwMode="auto">
           <a:xfrm flipH="0" flipV="0">
-            <a:off x="7267349" y="5346290"/>
-            <a:ext cx="773868" cy="365795"/>
+            <a:off x="7267348" y="5623716"/>
+            <a:ext cx="774516" cy="366119"/>
           </a:xfrm>
           <a:prstGeom prst="rect">
             <a:avLst/>
           </a:prstGeom>
-          <a:noFill/>
+          <a:solidFill>
+            <a:schemeClr val="accent4">
+              <a:lumMod val="40000"/>
+              <a:lumOff val="60000"/>
+            </a:schemeClr>
+          </a:solidFill>
           <a:ln w="12699">
             <a:solidFill>
-              <a:schemeClr val="accent4"/>
+              <a:schemeClr val="accent4">
+                <a:lumMod val="40000"/>
+                <a:lumOff val="60000"/>
+              </a:schemeClr>
             </a:solidFill>
             <a:prstDash val="solid"/>
           </a:ln>
@@ -15553,7 +16038,7 @@
             </a:pPr>
             <a:r>
               <a:rPr i="1"/>
-              <a:t>B.x=1</a:t>
+              <a:t>B.y=1</a:t>
             </a:r>
             <a:endParaRPr i="1"/>
           </a:p>
@@ -15565,13 +16050,14 @@
           <p:cNvCxnSpPr>
             <a:cxnSpLocks/>
             <a:stCxn id="1549401638" idx="3"/>
+            <a:endCxn id="1920693222" idx="1"/>
           </p:cNvCxnSpPr>
           <p:nvPr/>
         </p:nvCxnSpPr>
         <p:spPr bwMode="auto">
           <a:xfrm rot="0" flipH="0" flipV="0">
-            <a:off x="8041218" y="5529188"/>
-            <a:ext cx="304428" cy="168030"/>
+            <a:off x="8041216" y="5806614"/>
+            <a:ext cx="304200" cy="213143"/>
           </a:xfrm>
           <a:prstGeom prst="line">
             <a:avLst/>
@@ -15609,16 +16095,24 @@
         </p:nvSpPr>
         <p:spPr bwMode="auto">
           <a:xfrm flipH="0" flipV="0">
-            <a:off x="10399515" y="4228141"/>
+            <a:off x="10399514" y="3950713"/>
             <a:ext cx="1104041" cy="365795"/>
           </a:xfrm>
           <a:prstGeom prst="rect">
             <a:avLst/>
           </a:prstGeom>
-          <a:noFill/>
+          <a:solidFill>
+            <a:schemeClr val="accent4">
+              <a:lumMod val="40000"/>
+              <a:lumOff val="60000"/>
+            </a:schemeClr>
+          </a:solidFill>
           <a:ln w="12699">
             <a:solidFill>
-              <a:schemeClr val="accent4"/>
+              <a:schemeClr val="accent4">
+                <a:lumMod val="40000"/>
+                <a:lumOff val="60000"/>
+              </a:schemeClr>
             </a:solidFill>
             <a:prstDash val="solid"/>
           </a:ln>
@@ -15650,9 +16144,9 @@
           <p:nvPr/>
         </p:nvCxnSpPr>
         <p:spPr bwMode="auto">
-          <a:xfrm rot="10799989" flipH="0" flipV="1">
-            <a:off x="10184406" y="4411039"/>
-            <a:ext cx="215109" cy="277391"/>
+          <a:xfrm rot="10799990" flipH="0" flipV="1">
+            <a:off x="10183693" y="4133611"/>
+            <a:ext cx="215821" cy="277054"/>
           </a:xfrm>
           <a:prstGeom prst="line">
             <a:avLst/>
@@ -15811,6 +16305,12 @@
               <a:lumOff val="60000"/>
             </a:schemeClr>
           </a:solidFill>
+          <a:ln w="12699">
+            <a:solidFill>
+              <a:schemeClr val="tx1"/>
+            </a:solidFill>
+            <a:prstDash val="solid"/>
+          </a:ln>
         </p:spPr>
         <p:txBody>
           <a:bodyPr vertOverflow="overflow" horzOverflow="overflow" vert="horz" wrap="square" lIns="91440" tIns="45720" rIns="91440" bIns="45720" numCol="1" spcCol="0" rtlCol="0" fromWordArt="0" anchor="t" anchorCtr="0" forceAA="0" upright="0" compatLnSpc="0">
@@ -15832,6 +16332,117 @@
           </a:p>
         </p:txBody>
       </p:sp>
+      <p:sp>
+        <p:nvSpPr>
+          <p:cNvPr id="426868382" name=""/>
+          <p:cNvSpPr/>
+          <p:nvPr/>
+        </p:nvSpPr>
+        <p:spPr bwMode="auto">
+          <a:xfrm rot="0" flipH="0" flipV="0">
+            <a:off x="8192886" y="5106669"/>
+            <a:ext cx="1135008" cy="645238"/>
+          </a:xfrm>
+          <a:prstGeom prst="ellipse">
+            <a:avLst/>
+          </a:prstGeom>
+          <a:solidFill>
+            <a:schemeClr val="accent3">
+              <a:lumMod val="40000"/>
+              <a:lumOff val="60000"/>
+            </a:schemeClr>
+          </a:solidFill>
+          <a:ln w="12700" cap="flat" cmpd="sng" algn="ctr">
+            <a:solidFill>
+              <a:schemeClr val="tx1"/>
+            </a:solidFill>
+            <a:prstDash val="solid"/>
+            <a:miter lim="800000"/>
+          </a:ln>
+        </p:spPr>
+        <p:style>
+          <a:lnRef idx="2">
+            <a:schemeClr val="accent1">
+              <a:shade val="50000"/>
+            </a:schemeClr>
+          </a:lnRef>
+          <a:fillRef idx="1">
+            <a:schemeClr val="accent1"/>
+          </a:fillRef>
+          <a:effectRef idx="0">
+            <a:schemeClr val="accent1"/>
+          </a:effectRef>
+          <a:fontRef idx="minor">
+            <a:schemeClr val="lt1"/>
+          </a:fontRef>
+        </p:style>
+        <p:txBody>
+          <a:bodyPr vertOverflow="overflow" horzOverflow="overflow" vert="horz" wrap="square" lIns="0" tIns="0" rIns="0" bIns="0" numCol="1" spcCol="0" rtlCol="0" fromWordArt="0" anchor="ctr" anchorCtr="0" forceAA="0" upright="0" compatLnSpc="0"/>
+          <a:p>
+            <a:pPr algn="ctr">
+              <a:defRPr/>
+            </a:pPr>
+            <a:r>
+              <a:rPr sz="1600">
+                <a:solidFill>
+                  <a:schemeClr val="tx1"/>
+                </a:solidFill>
+              </a:rPr>
+              <a:t>Hash</a:t>
+            </a:r>
+            <a:endParaRPr>
+              <a:solidFill>
+                <a:schemeClr val="tx1"/>
+              </a:solidFill>
+            </a:endParaRPr>
+          </a:p>
+        </p:txBody>
+      </p:sp>
+      <p:cxnSp>
+        <p:nvCxnSpPr>
+          <p:cNvPr id="504852564" name=""/>
+          <p:cNvCxnSpPr>
+            <a:cxnSpLocks/>
+            <a:stCxn id="375855938" idx="3"/>
+            <a:endCxn id="426868382" idx="7"/>
+          </p:cNvCxnSpPr>
+          <p:nvPr/>
+        </p:nvCxnSpPr>
+        <p:spPr bwMode="auto">
+          <a:xfrm rot="5399978" flipH="0" flipV="0">
+            <a:off x="9019734" y="5008860"/>
+            <a:ext cx="334243" cy="50360"/>
+          </a:xfrm>
+          <a:prstGeom prst="line">
+            <a:avLst/>
+          </a:prstGeom>
+          <a:ln w="19049" cap="flat" cmpd="sng" algn="ctr">
+            <a:solidFill>
+              <a:schemeClr val="tx1"/>
+            </a:solidFill>
+            <a:prstDash val="solid"/>
+            <a:miter lim="800000"/>
+            <a:headEnd type="none"/>
+            <a:tailEnd type="none" w="lg" len="lg"/>
+          </a:ln>
+        </p:spPr>
+        <p:style>
+          <a:lnRef idx="1">
+            <a:schemeClr val="accent1">
+              <a:shade val="50000"/>
+            </a:schemeClr>
+          </a:lnRef>
+          <a:fillRef idx="0">
+            <a:schemeClr val="accent1"/>
+          </a:fillRef>
+          <a:effectRef idx="0">
+            <a:schemeClr val="accent1"/>
+          </a:effectRef>
+          <a:fontRef idx="minor">
+            <a:schemeClr val="tx1"/>
+          </a:fontRef>
+        </p:style>
+      </p:cxnSp>
     </p:spTree>
   </p:cSld>
   <p:clrMapOvr>
@@ -18923,9 +19534,9 @@
           <p:nvPr/>
         </p:nvCxnSpPr>
         <p:spPr bwMode="auto">
-          <a:xfrm rot="5399976" flipH="0" flipV="0">
-            <a:off x="8903217" y="4832308"/>
-            <a:ext cx="304413" cy="314649"/>
+          <a:xfrm rot="5399978" flipH="0" flipV="0">
+            <a:off x="8903320" y="4833123"/>
+            <a:ext cx="303494" cy="313937"/>
           </a:xfrm>
           <a:prstGeom prst="line">
             <a:avLst/>
@@ -19013,9 +19624,9 @@
           <p:nvPr/>
         </p:nvCxnSpPr>
         <p:spPr bwMode="auto">
-          <a:xfrm rot="5399976" flipH="0" flipV="0">
-            <a:off x="8811149" y="2541920"/>
-            <a:ext cx="488548" cy="0"/>
+          <a:xfrm rot="5399978" flipH="0" flipV="0">
+            <a:off x="8810301" y="2542022"/>
+            <a:ext cx="488754" cy="0"/>
           </a:xfrm>
           <a:prstGeom prst="line">
             <a:avLst/>
@@ -19055,7 +19666,7 @@
         </p:nvSpPr>
         <p:spPr bwMode="auto">
           <a:xfrm rot="0" flipH="0" flipV="0">
-            <a:off x="8486688" y="2786195"/>
+            <a:off x="8485200" y="2786400"/>
             <a:ext cx="1135009" cy="645239"/>
           </a:xfrm>
           <a:prstGeom prst="ellipse">
@@ -19092,7 +19703,7 @@
           </a:fontRef>
         </p:style>
         <p:txBody>
-          <a:bodyPr vertOverflow="overflow" horzOverflow="overflow" vert="horz" wrap="square" lIns="91440" tIns="45720" rIns="91440" bIns="45720" numCol="1" spcCol="0" rtlCol="0" fromWordArt="0" anchor="ctr" anchorCtr="0" forceAA="0" upright="0" compatLnSpc="0"/>
+          <a:bodyPr vertOverflow="overflow" horzOverflow="overflow" vert="horz" wrap="square" lIns="0" tIns="0" rIns="0" bIns="0" numCol="1" spcCol="0" rtlCol="0" fromWordArt="0" anchor="ctr" anchorCtr="0" forceAA="0" upright="0" compatLnSpc="0"/>
           <a:p>
             <a:pPr algn="ctr">
               <a:defRPr/>
@@ -19121,7 +19732,7 @@
         </p:nvSpPr>
         <p:spPr bwMode="auto">
           <a:xfrm rot="0" flipH="0" flipV="0">
-            <a:off x="9113932" y="599583"/>
+            <a:off x="9115200" y="601200"/>
             <a:ext cx="1374131" cy="645239"/>
           </a:xfrm>
           <a:prstGeom prst="ellipse">
@@ -19158,7 +19769,7 @@
           </a:fontRef>
         </p:style>
         <p:txBody>
-          <a:bodyPr vertOverflow="overflow" horzOverflow="overflow" vert="horz" wrap="square" lIns="91440" tIns="45720" rIns="91440" bIns="45720" numCol="1" spcCol="0" rtlCol="0" fromWordArt="0" anchor="ctr" anchorCtr="0" forceAA="0" upright="0" compatLnSpc="0"/>
+          <a:bodyPr vertOverflow="overflow" horzOverflow="overflow" vert="horz" wrap="square" lIns="0" tIns="0" rIns="0" bIns="0" numCol="1" spcCol="0" rtlCol="0" fromWordArt="0" anchor="ctr" anchorCtr="0" forceAA="0" upright="0" compatLnSpc="0"/>
           <a:p>
             <a:pPr algn="ctr">
               <a:defRPr/>
@@ -19190,9 +19801,9 @@
           <p:nvPr/>
         </p:nvCxnSpPr>
         <p:spPr bwMode="auto">
-          <a:xfrm rot="5399976" flipH="0" flipV="1">
-            <a:off x="9569513" y="1867643"/>
-            <a:ext cx="1635864" cy="201236"/>
+          <a:xfrm rot="5399978" flipH="0" flipV="1">
+            <a:off x="9570954" y="1869085"/>
+            <a:ext cx="1634247" cy="199968"/>
           </a:xfrm>
           <a:prstGeom prst="line">
             <a:avLst/>
@@ -19469,7 +20080,7 @@
         </p:nvCxnSpPr>
         <p:spPr bwMode="auto">
           <a:xfrm rot="5399976" flipH="0" flipV="0">
-            <a:off x="9050090" y="1214171"/>
+            <a:off x="9051359" y="1215788"/>
             <a:ext cx="328920" cy="201236"/>
           </a:xfrm>
           <a:prstGeom prst="line">
@@ -19981,8 +20592,8 @@
         </p:nvSpPr>
         <p:spPr bwMode="auto">
           <a:xfrm flipH="0" flipV="0">
-            <a:off x="669592" y="1252749"/>
-            <a:ext cx="1104041" cy="365795"/>
+            <a:off x="484640" y="1252748"/>
+            <a:ext cx="1238186" cy="366119"/>
           </a:xfrm>
           <a:prstGeom prst="rect">
             <a:avLst/>
@@ -20005,93 +20616,12 @@
             </a:pPr>
             <a:r>
               <a:rPr i="1"/>
-              <a:t>A.x &lt; B.x</a:t>
+              <a:t>A.x &lt;&gt; B.x</a:t>
             </a:r>
             <a:endParaRPr i="1"/>
           </a:p>
         </p:txBody>
       </p:sp>
-      <p:sp>
-        <p:nvSpPr>
-          <p:cNvPr id="1397298504" name=""/>
-          <p:cNvSpPr txBox="1"/>
-          <p:nvPr/>
-        </p:nvSpPr>
-        <p:spPr bwMode="auto">
-          <a:xfrm flipH="0" flipV="0">
-            <a:off x="3629288" y="2357671"/>
-            <a:ext cx="900893" cy="365795"/>
-          </a:xfrm>
-          <a:prstGeom prst="rect">
-            <a:avLst/>
-          </a:prstGeom>
-          <a:noFill/>
-          <a:ln w="19049">
-            <a:solidFill>
-              <a:schemeClr val="accent4"/>
-            </a:solidFill>
-            <a:prstDash val="solid"/>
-          </a:ln>
-        </p:spPr>
-        <p:txBody>
-          <a:bodyPr vertOverflow="overflow" horzOverflow="overflow" vert="horz" wrap="none" lIns="91440" tIns="45720" rIns="91440" bIns="45720" numCol="1" spcCol="0" rtlCol="0" fromWordArt="0" anchor="t" anchorCtr="0" forceAA="0" upright="0" compatLnSpc="0">
-            <a:spAutoFit/>
-          </a:bodyPr>
-          <a:p>
-            <a:pPr>
-              <a:defRPr/>
-            </a:pPr>
-            <a:r>
-              <a:rPr i="1"/>
-              <a:t>B.x = 1</a:t>
-            </a:r>
-            <a:endParaRPr/>
-          </a:p>
-        </p:txBody>
-      </p:sp>
-      <p:cxnSp>
-        <p:nvCxnSpPr>
-          <p:cNvPr id="1383940770" name=""/>
-          <p:cNvCxnSpPr>
-            <a:cxnSpLocks/>
-            <a:stCxn id="1397298504" idx="1"/>
-            <a:endCxn id="412835837" idx="7"/>
-          </p:cNvCxnSpPr>
-          <p:nvPr/>
-        </p:nvCxnSpPr>
-        <p:spPr bwMode="auto">
-          <a:xfrm rot="10799989" flipH="0" flipV="1">
-            <a:off x="3388779" y="2540569"/>
-            <a:ext cx="240509" cy="253769"/>
-          </a:xfrm>
-          <a:prstGeom prst="line">
-            <a:avLst/>
-          </a:prstGeom>
-          <a:ln w="19049" cap="flat" cmpd="sng" algn="ctr">
-            <a:solidFill>
-              <a:schemeClr val="accent4"/>
-            </a:solidFill>
-            <a:prstDash val="sysDot"/>
-            <a:miter lim="800000"/>
-          </a:ln>
-        </p:spPr>
-        <p:style>
-          <a:lnRef idx="1">
-            <a:schemeClr val="accent1">
-              <a:shade val="50000"/>
-            </a:schemeClr>
-          </a:lnRef>
-          <a:fillRef idx="0">
-            <a:schemeClr val="accent1"/>
-          </a:fillRef>
-          <a:effectRef idx="0">
-            <a:schemeClr val="accent1"/>
-          </a:effectRef>
-          <a:fontRef idx="minor">
-            <a:schemeClr val="tx1"/>
-          </a:fontRef>
-        </p:style>
-      </p:cxnSp>
       <p:cxnSp>
         <p:nvCxnSpPr>
           <p:cNvPr id="834955082" name=""/>
@@ -20104,89 +20634,8 @@
         </p:nvCxnSpPr>
         <p:spPr bwMode="auto">
           <a:xfrm rot="0" flipH="0" flipV="0">
-            <a:off x="1773633" y="1435647"/>
-            <a:ext cx="77814" cy="349903"/>
-          </a:xfrm>
-          <a:prstGeom prst="line">
-            <a:avLst/>
-          </a:prstGeom>
-          <a:ln w="19049" cap="flat" cmpd="sng" algn="ctr">
-            <a:solidFill>
-              <a:schemeClr val="accent4"/>
-            </a:solidFill>
-            <a:prstDash val="sysDot"/>
-            <a:miter lim="800000"/>
-          </a:ln>
-        </p:spPr>
-        <p:style>
-          <a:lnRef idx="1">
-            <a:schemeClr val="accent1">
-              <a:shade val="50000"/>
-            </a:schemeClr>
-          </a:lnRef>
-          <a:fillRef idx="0">
-            <a:schemeClr val="accent1"/>
-          </a:fillRef>
-          <a:effectRef idx="0">
-            <a:schemeClr val="accent1"/>
-          </a:effectRef>
-          <a:fontRef idx="minor">
-            <a:schemeClr val="tx1"/>
-          </a:fontRef>
-        </p:style>
-      </p:cxnSp>
-      <p:sp>
-        <p:nvSpPr>
-          <p:cNvPr id="2009073331" name=""/>
-          <p:cNvSpPr txBox="1"/>
-          <p:nvPr/>
-        </p:nvSpPr>
-        <p:spPr bwMode="auto">
-          <a:xfrm flipH="0" flipV="0">
-            <a:off x="11116143" y="2481100"/>
-            <a:ext cx="900893" cy="365795"/>
-          </a:xfrm>
-          <a:prstGeom prst="rect">
-            <a:avLst/>
-          </a:prstGeom>
-          <a:noFill/>
-          <a:ln w="19049">
-            <a:solidFill>
-              <a:schemeClr val="accent4"/>
-            </a:solidFill>
-            <a:prstDash val="solid"/>
-          </a:ln>
-        </p:spPr>
-        <p:txBody>
-          <a:bodyPr vertOverflow="overflow" horzOverflow="overflow" vert="horz" wrap="none" lIns="91440" tIns="45720" rIns="91440" bIns="45720" numCol="1" spcCol="0" rtlCol="0" fromWordArt="0" anchor="t" anchorCtr="0" forceAA="0" upright="0" compatLnSpc="0">
-            <a:spAutoFit/>
-          </a:bodyPr>
-          <a:p>
-            <a:pPr>
-              <a:defRPr/>
-            </a:pPr>
-            <a:r>
-              <a:rPr i="1"/>
-              <a:t>B.x = 1</a:t>
-            </a:r>
-            <a:endParaRPr/>
-          </a:p>
-        </p:txBody>
-      </p:sp>
-      <p:cxnSp>
-        <p:nvCxnSpPr>
-          <p:cNvPr id="1052013367" name=""/>
-          <p:cNvCxnSpPr>
-            <a:cxnSpLocks/>
-            <a:stCxn id="2009073331" idx="1"/>
-            <a:endCxn id="750187744" idx="7"/>
-          </p:cNvCxnSpPr>
-          <p:nvPr/>
-        </p:nvCxnSpPr>
-        <p:spPr bwMode="auto">
-          <a:xfrm rot="10799989" flipH="0" flipV="1">
-            <a:off x="10889349" y="2663997"/>
-            <a:ext cx="226793" cy="216688"/>
+            <a:off x="1722826" y="1435808"/>
+            <a:ext cx="128621" cy="349740"/>
           </a:xfrm>
           <a:prstGeom prst="line">
             <a:avLst/>
@@ -20290,7 +20739,7 @@
         </p:nvSpPr>
         <p:spPr bwMode="auto">
           <a:xfrm rot="0" flipH="0" flipV="0">
-            <a:off x="9011512" y="4286679"/>
+            <a:off x="9010800" y="4287600"/>
             <a:ext cx="1374130" cy="645239"/>
           </a:xfrm>
           <a:prstGeom prst="ellipse">
@@ -20327,7 +20776,7 @@
           </a:fontRef>
         </p:style>
         <p:txBody>
-          <a:bodyPr vertOverflow="overflow" horzOverflow="overflow" vert="horz" wrap="square" lIns="91440" tIns="45720" rIns="91440" bIns="45720" numCol="1" spcCol="0" rtlCol="0" fromWordArt="0" anchor="ctr" anchorCtr="0" forceAA="0" upright="0" compatLnSpc="0"/>
+          <a:bodyPr vertOverflow="overflow" horzOverflow="overflow" vert="horz" wrap="square" lIns="0" tIns="0" rIns="0" bIns="0" numCol="1" spcCol="0" rtlCol="0" fromWordArt="0" anchor="ctr" anchorCtr="0" forceAA="0" upright="0" compatLnSpc="0"/>
           <a:p>
             <a:pPr algn="ctr">
               <a:defRPr/>
@@ -20359,9 +20808,9 @@
           <p:nvPr/>
         </p:nvCxnSpPr>
         <p:spPr bwMode="auto">
-          <a:xfrm rot="5399976" flipH="0" flipV="1">
-            <a:off x="10105981" y="4915851"/>
-            <a:ext cx="304413" cy="147562"/>
+          <a:xfrm rot="5399978" flipH="0" flipV="1">
+            <a:off x="10106084" y="4915954"/>
+            <a:ext cx="303492" cy="148275"/>
           </a:xfrm>
           <a:prstGeom prst="line">
             <a:avLst/>
@@ -20395,14 +20844,14 @@
       </p:cxnSp>
       <p:sp>
         <p:nvSpPr>
-          <p:cNvPr id="1254351192" name=""/>
+          <p:cNvPr id="71656691" name=""/>
           <p:cNvSpPr txBox="1"/>
           <p:nvPr/>
         </p:nvSpPr>
         <p:spPr bwMode="auto">
           <a:xfrm flipH="0" flipV="0">
-            <a:off x="7420978" y="4885403"/>
-            <a:ext cx="773868" cy="365795"/>
+            <a:off x="10399514" y="3920882"/>
+            <a:ext cx="1238186" cy="366119"/>
           </a:xfrm>
           <a:prstGeom prst="rect">
             <a:avLst/>
@@ -20425,87 +20874,7 @@
             </a:pPr>
             <a:r>
               <a:rPr i="1"/>
-              <a:t>B.x=1</a:t>
-            </a:r>
-            <a:endParaRPr i="1"/>
-          </a:p>
-        </p:txBody>
-      </p:sp>
-      <p:cxnSp>
-        <p:nvCxnSpPr>
-          <p:cNvPr id="322237526" name=""/>
-          <p:cNvCxnSpPr>
-            <a:cxnSpLocks/>
-            <a:stCxn id="1254351192" idx="3"/>
-          </p:cNvCxnSpPr>
-          <p:nvPr/>
-        </p:nvCxnSpPr>
-        <p:spPr bwMode="auto">
-          <a:xfrm rot="0" flipH="0" flipV="0">
-            <a:off x="8194847" y="5068301"/>
-            <a:ext cx="304428" cy="168030"/>
-          </a:xfrm>
-          <a:prstGeom prst="line">
-            <a:avLst/>
-          </a:prstGeom>
-          <a:ln w="19049" cap="flat" cmpd="sng" algn="ctr">
-            <a:solidFill>
-              <a:schemeClr val="accent4"/>
-            </a:solidFill>
-            <a:prstDash val="sysDot"/>
-            <a:miter lim="800000"/>
-          </a:ln>
-        </p:spPr>
-        <p:style>
-          <a:lnRef idx="1">
-            <a:schemeClr val="accent1">
-              <a:shade val="50000"/>
-            </a:schemeClr>
-          </a:lnRef>
-          <a:fillRef idx="0">
-            <a:schemeClr val="accent1"/>
-          </a:fillRef>
-          <a:effectRef idx="0">
-            <a:schemeClr val="accent1"/>
-          </a:effectRef>
-          <a:fontRef idx="minor">
-            <a:schemeClr val="tx1"/>
-          </a:fontRef>
-        </p:style>
-      </p:cxnSp>
-      <p:sp>
-        <p:nvSpPr>
-          <p:cNvPr id="71656691" name=""/>
-          <p:cNvSpPr txBox="1"/>
-          <p:nvPr/>
-        </p:nvSpPr>
-        <p:spPr bwMode="auto">
-          <a:xfrm flipH="0" flipV="0">
-            <a:off x="10399515" y="3920883"/>
-            <a:ext cx="1104041" cy="365795"/>
-          </a:xfrm>
-          <a:prstGeom prst="rect">
-            <a:avLst/>
-          </a:prstGeom>
-          <a:noFill/>
-          <a:ln w="19049">
-            <a:solidFill>
-              <a:schemeClr val="accent4"/>
-            </a:solidFill>
-            <a:prstDash val="solid"/>
-          </a:ln>
-        </p:spPr>
-        <p:txBody>
-          <a:bodyPr vertOverflow="overflow" horzOverflow="overflow" vert="horz" wrap="none" lIns="91440" tIns="45720" rIns="91440" bIns="45720" numCol="1" spcCol="0" rtlCol="0" fromWordArt="0" anchor="t" anchorCtr="0" forceAA="0" upright="0" compatLnSpc="0">
-            <a:spAutoFit/>
-          </a:bodyPr>
-          <a:p>
-            <a:pPr>
-              <a:defRPr/>
-            </a:pPr>
-            <a:r>
-              <a:rPr i="1"/>
-              <a:t>A.x &lt; B.x</a:t>
+              <a:t>A.x &lt;&gt; B.x</a:t>
             </a:r>
             <a:endParaRPr/>
           </a:p>
@@ -20522,9 +20891,9 @@
           <p:nvPr/>
         </p:nvCxnSpPr>
         <p:spPr bwMode="auto">
-          <a:xfrm rot="10799989" flipH="0" flipV="1">
-            <a:off x="10184406" y="4103781"/>
-            <a:ext cx="215109" cy="277391"/>
+          <a:xfrm rot="10799990" flipH="0" flipV="1">
+            <a:off x="10183693" y="4103780"/>
+            <a:ext cx="215821" cy="278312"/>
           </a:xfrm>
           <a:prstGeom prst="line">
             <a:avLst/>
@@ -20829,8 +21198,8 @@
         </p:nvSpPr>
         <p:spPr bwMode="auto">
           <a:xfrm flipH="0" flipV="0">
-            <a:off x="10624752" y="440403"/>
-            <a:ext cx="1104041" cy="365795"/>
+            <a:off x="10624752" y="440402"/>
+            <a:ext cx="1238186" cy="366119"/>
           </a:xfrm>
           <a:prstGeom prst="rect">
             <a:avLst/>
@@ -20853,7 +21222,7 @@
             </a:pPr>
             <a:r>
               <a:rPr i="1"/>
-              <a:t>A.x &lt; B.x</a:t>
+              <a:t>A.x &lt;&gt; B.x</a:t>
             </a:r>
             <a:endParaRPr i="1"/>
           </a:p>
@@ -20870,9 +21239,9 @@
           <p:nvPr/>
         </p:nvCxnSpPr>
         <p:spPr bwMode="auto">
-          <a:xfrm rot="10799989" flipH="0" flipV="1">
-            <a:off x="10286826" y="623301"/>
-            <a:ext cx="337926" cy="70774"/>
+          <a:xfrm rot="10799990" flipH="0" flipV="1">
+            <a:off x="10288094" y="623462"/>
+            <a:ext cx="336657" cy="72230"/>
           </a:xfrm>
           <a:prstGeom prst="line">
             <a:avLst/>
@@ -30787,4 +31156,211 @@
   </a:themeElements>
   <a:objectDefaults/>
 </a:theme>
+</file>
+
+<file path=ppt/theme/theme2.xml><?xml version="1.0" encoding="utf-8"?>
+<a:theme xmlns:a="http://schemas.openxmlformats.org/drawingml/2006/main" xmlns:r="http://schemas.openxmlformats.org/officeDocument/2006/relationships" xmlns:p="http://schemas.openxmlformats.org/presentationml/2006/main" name="Office Theme">
+  <a:themeElements>
+    <a:clrScheme name="New Office">
+      <a:dk1>
+        <a:sysClr val="windowText" lastClr="000000"/>
+      </a:dk1>
+      <a:lt1>
+        <a:sysClr val="window" lastClr="FFFFFF"/>
+      </a:lt1>
+      <a:dk2>
+        <a:srgbClr val="44546A"/>
+      </a:dk2>
+      <a:lt2>
+        <a:srgbClr val="E7E6E6"/>
+      </a:lt2>
+      <a:accent1>
+        <a:srgbClr val="5B9BD5"/>
+      </a:accent1>
+      <a:accent2>
+        <a:srgbClr val="ED7D31"/>
+      </a:accent2>
+      <a:accent3>
+        <a:srgbClr val="A5A5A5"/>
+      </a:accent3>
+      <a:accent4>
+        <a:srgbClr val="FFC000"/>
+      </a:accent4>
+      <a:accent5>
+        <a:srgbClr val="4472C4"/>
+      </a:accent5>
+      <a:accent6>
+        <a:srgbClr val="70AD47"/>
+      </a:accent6>
+      <a:hlink>
+        <a:srgbClr val="0563C1"/>
+      </a:hlink>
+      <a:folHlink>
+        <a:srgbClr val="954F72"/>
+      </a:folHlink>
+    </a:clrScheme>
+    <a:fontScheme name="">
+      <a:majorFont>
+        <a:latin typeface="Arial"/>
+        <a:ea typeface="Arial"/>
+        <a:cs typeface="Arial"/>
+      </a:majorFont>
+      <a:minorFont>
+        <a:latin typeface="Arial"/>
+        <a:ea typeface="Arial"/>
+        <a:cs typeface="Arial"/>
+      </a:minorFont>
+    </a:fontScheme>
+    <a:fmtScheme name="Office Theme">
+      <a:fillStyleLst>
+        <a:solidFill>
+          <a:schemeClr val="phClr"/>
+        </a:solidFill>
+        <a:gradFill>
+          <a:gsLst>
+            <a:gs pos="0">
+              <a:schemeClr val="phClr">
+                <a:lumMod val="110000"/>
+                <a:satMod val="105000"/>
+                <a:tint val="67000"/>
+              </a:schemeClr>
+            </a:gs>
+            <a:gs pos="50000">
+              <a:schemeClr val="phClr">
+                <a:lumMod val="105000"/>
+                <a:satMod val="103000"/>
+                <a:tint val="73000"/>
+              </a:schemeClr>
+            </a:gs>
+            <a:gs pos="100000">
+              <a:schemeClr val="phClr">
+                <a:lumMod val="105000"/>
+                <a:satMod val="109000"/>
+                <a:tint val="81000"/>
+              </a:schemeClr>
+            </a:gs>
+          </a:gsLst>
+          <a:lin ang="5400000" scaled="0"/>
+        </a:gradFill>
+        <a:gradFill>
+          <a:gsLst>
+            <a:gs pos="0">
+              <a:schemeClr val="phClr">
+                <a:satMod val="103000"/>
+                <a:lumMod val="102000"/>
+                <a:tint val="94000"/>
+              </a:schemeClr>
+            </a:gs>
+            <a:gs pos="50000">
+              <a:schemeClr val="phClr">
+                <a:satMod val="110000"/>
+                <a:lumMod val="100000"/>
+                <a:shade val="100000"/>
+              </a:schemeClr>
+            </a:gs>
+            <a:gs pos="100000">
+              <a:schemeClr val="phClr">
+                <a:lumMod val="99000"/>
+                <a:satMod val="120000"/>
+                <a:shade val="78000"/>
+              </a:schemeClr>
+            </a:gs>
+          </a:gsLst>
+          <a:lin ang="5400000" scaled="0"/>
+        </a:gradFill>
+      </a:fillStyleLst>
+      <a:lnStyleLst>
+        <a:ln w="6350" cap="flat" cmpd="sng" algn="ctr">
+          <a:solidFill>
+            <a:schemeClr val="phClr"/>
+          </a:solidFill>
+          <a:prstDash val="solid"/>
+          <a:miter lim="800000"/>
+        </a:ln>
+        <a:ln w="12700" cap="flat" cmpd="sng" algn="ctr">
+          <a:solidFill>
+            <a:schemeClr val="phClr"/>
+          </a:solidFill>
+          <a:prstDash val="solid"/>
+          <a:miter lim="800000"/>
+        </a:ln>
+        <a:ln w="19050" cap="flat" cmpd="sng" algn="ctr">
+          <a:solidFill>
+            <a:schemeClr val="phClr"/>
+          </a:solidFill>
+          <a:prstDash val="solid"/>
+          <a:miter lim="800000"/>
+        </a:ln>
+      </a:lnStyleLst>
+      <a:effectStyleLst>
+        <a:effectStyle>
+          <a:effectLst>
+            <a:outerShdw blurRad="40000" dist="20000" dir="5400000" rotWithShape="0">
+              <a:srgbClr val="000000">
+                <a:alpha val="38000"/>
+              </a:srgbClr>
+            </a:outerShdw>
+          </a:effectLst>
+        </a:effectStyle>
+        <a:effectStyle>
+          <a:effectLst>
+            <a:outerShdw blurRad="40000" dist="23000" dir="5400000" rotWithShape="0">
+              <a:srgbClr val="000000">
+                <a:alpha val="35000"/>
+              </a:srgbClr>
+            </a:outerShdw>
+          </a:effectLst>
+        </a:effectStyle>
+        <a:effectStyle>
+          <a:effectLst>
+            <a:outerShdw blurRad="40000" dist="23000" dir="5400000" rotWithShape="0">
+              <a:srgbClr val="000000">
+                <a:alpha val="35000"/>
+              </a:srgbClr>
+            </a:outerShdw>
+          </a:effectLst>
+        </a:effectStyle>
+      </a:effectStyleLst>
+      <a:bgFillStyleLst>
+        <a:solidFill>
+          <a:schemeClr val="phClr"/>
+        </a:solidFill>
+        <a:solidFill>
+          <a:schemeClr val="phClr">
+            <a:tint val="95000"/>
+            <a:satMod val="170000"/>
+          </a:schemeClr>
+        </a:solidFill>
+        <a:gradFill>
+          <a:gsLst>
+            <a:gs pos="0">
+              <a:schemeClr val="phClr">
+                <a:tint val="93000"/>
+                <a:satMod val="150000"/>
+                <a:shade val="98000"/>
+                <a:lumMod val="102000"/>
+              </a:schemeClr>
+            </a:gs>
+            <a:gs pos="50000">
+              <a:schemeClr val="phClr">
+                <a:tint val="98000"/>
+                <a:satMod val="130000"/>
+                <a:shade val="90000"/>
+                <a:lumMod val="103000"/>
+              </a:schemeClr>
+            </a:gs>
+            <a:gs pos="100000">
+              <a:schemeClr val="phClr">
+                <a:shade val="63000"/>
+                <a:satMod val="120000"/>
+              </a:schemeClr>
+            </a:gs>
+          </a:gsLst>
+          <a:lin ang="5400000" scaled="0"/>
+        </a:gradFill>
+      </a:bgFillStyleLst>
+    </a:fmtScheme>
+  </a:themeElements>
+  <a:objectDefaults/>
+</a:theme>
 </file>
</xml_diff>